<commit_message>
add api schema documentation
</commit_message>
<xml_diff>
--- a/inst/Cheatsheet.pptx
+++ b/inst/Cheatsheet.pptx
@@ -270,7 +270,7 @@
           <a:p>
             <a:fld id="{5B5DB045-1D2A-470B-8706-D901553708B3}" type="datetimeFigureOut">
               <a:rPr lang="en-GB" smtClean="0"/>
-              <a:t>25/07/2025</a:t>
+              <a:t>31/08/2025</a:t>
             </a:fld>
             <a:endParaRPr lang="en-GB"/>
           </a:p>
@@ -468,7 +468,7 @@
           <a:p>
             <a:fld id="{5B5DB045-1D2A-470B-8706-D901553708B3}" type="datetimeFigureOut">
               <a:rPr lang="en-GB" smtClean="0"/>
-              <a:t>25/07/2025</a:t>
+              <a:t>31/08/2025</a:t>
             </a:fld>
             <a:endParaRPr lang="en-GB"/>
           </a:p>
@@ -676,7 +676,7 @@
           <a:p>
             <a:fld id="{5B5DB045-1D2A-470B-8706-D901553708B3}" type="datetimeFigureOut">
               <a:rPr lang="en-GB" smtClean="0"/>
-              <a:t>25/07/2025</a:t>
+              <a:t>31/08/2025</a:t>
             </a:fld>
             <a:endParaRPr lang="en-GB"/>
           </a:p>
@@ -874,7 +874,7 @@
           <a:p>
             <a:fld id="{5B5DB045-1D2A-470B-8706-D901553708B3}" type="datetimeFigureOut">
               <a:rPr lang="en-GB" smtClean="0"/>
-              <a:t>25/07/2025</a:t>
+              <a:t>31/08/2025</a:t>
             </a:fld>
             <a:endParaRPr lang="en-GB"/>
           </a:p>
@@ -1149,7 +1149,7 @@
           <a:p>
             <a:fld id="{5B5DB045-1D2A-470B-8706-D901553708B3}" type="datetimeFigureOut">
               <a:rPr lang="en-GB" smtClean="0"/>
-              <a:t>25/07/2025</a:t>
+              <a:t>31/08/2025</a:t>
             </a:fld>
             <a:endParaRPr lang="en-GB"/>
           </a:p>
@@ -1414,7 +1414,7 @@
           <a:p>
             <a:fld id="{5B5DB045-1D2A-470B-8706-D901553708B3}" type="datetimeFigureOut">
               <a:rPr lang="en-GB" smtClean="0"/>
-              <a:t>25/07/2025</a:t>
+              <a:t>31/08/2025</a:t>
             </a:fld>
             <a:endParaRPr lang="en-GB"/>
           </a:p>
@@ -1826,7 +1826,7 @@
           <a:p>
             <a:fld id="{5B5DB045-1D2A-470B-8706-D901553708B3}" type="datetimeFigureOut">
               <a:rPr lang="en-GB" smtClean="0"/>
-              <a:t>25/07/2025</a:t>
+              <a:t>31/08/2025</a:t>
             </a:fld>
             <a:endParaRPr lang="en-GB"/>
           </a:p>
@@ -1967,7 +1967,7 @@
           <a:p>
             <a:fld id="{5B5DB045-1D2A-470B-8706-D901553708B3}" type="datetimeFigureOut">
               <a:rPr lang="en-GB" smtClean="0"/>
-              <a:t>25/07/2025</a:t>
+              <a:t>31/08/2025</a:t>
             </a:fld>
             <a:endParaRPr lang="en-GB"/>
           </a:p>
@@ -2080,7 +2080,7 @@
           <a:p>
             <a:fld id="{5B5DB045-1D2A-470B-8706-D901553708B3}" type="datetimeFigureOut">
               <a:rPr lang="en-GB" smtClean="0"/>
-              <a:t>25/07/2025</a:t>
+              <a:t>31/08/2025</a:t>
             </a:fld>
             <a:endParaRPr lang="en-GB"/>
           </a:p>
@@ -2391,7 +2391,7 @@
           <a:p>
             <a:fld id="{5B5DB045-1D2A-470B-8706-D901553708B3}" type="datetimeFigureOut">
               <a:rPr lang="en-GB" smtClean="0"/>
-              <a:t>25/07/2025</a:t>
+              <a:t>31/08/2025</a:t>
             </a:fld>
             <a:endParaRPr lang="en-GB"/>
           </a:p>
@@ -2679,7 +2679,7 @@
           <a:p>
             <a:fld id="{5B5DB045-1D2A-470B-8706-D901553708B3}" type="datetimeFigureOut">
               <a:rPr lang="en-GB" smtClean="0"/>
-              <a:t>25/07/2025</a:t>
+              <a:t>31/08/2025</a:t>
             </a:fld>
             <a:endParaRPr lang="en-GB"/>
           </a:p>
@@ -2920,7 +2920,7 @@
           <a:p>
             <a:fld id="{5B5DB045-1D2A-470B-8706-D901553708B3}" type="datetimeFigureOut">
               <a:rPr lang="en-GB" smtClean="0"/>
-              <a:t>25/07/2025</a:t>
+              <a:t>31/08/2025</a:t>
             </a:fld>
             <a:endParaRPr lang="en-GB"/>
           </a:p>
@@ -4661,6 +4661,1756 @@
           </p:txBody>
         </p:sp>
       </p:grpSp>
+      <p:sp>
+        <p:nvSpPr>
+          <p:cNvPr id="12" name="Rectangle 11">
+            <a:extLst>
+              <a:ext uri="{FF2B5EF4-FFF2-40B4-BE49-F238E27FC236}">
+                <a16:creationId xmlns:a16="http://schemas.microsoft.com/office/drawing/2014/main" id="{9212ADAA-5D0B-45A9-2618-006BD30BBE03}"/>
+              </a:ext>
+            </a:extLst>
+          </p:cNvPr>
+          <p:cNvSpPr/>
+          <p:nvPr/>
+        </p:nvSpPr>
+        <p:spPr>
+          <a:xfrm>
+            <a:off x="6570154" y="938758"/>
+            <a:ext cx="1082439" cy="276999"/>
+          </a:xfrm>
+          <a:prstGeom prst="rect">
+            <a:avLst/>
+          </a:prstGeom>
+        </p:spPr>
+        <p:style>
+          <a:lnRef idx="1">
+            <a:schemeClr val="accent4"/>
+          </a:lnRef>
+          <a:fillRef idx="2">
+            <a:schemeClr val="accent4"/>
+          </a:fillRef>
+          <a:effectRef idx="1">
+            <a:schemeClr val="accent4"/>
+          </a:effectRef>
+          <a:fontRef idx="minor">
+            <a:schemeClr val="dk1"/>
+          </a:fontRef>
+        </p:style>
+        <p:txBody>
+          <a:bodyPr rtlCol="0" anchor="ctr"/>
+          <a:lstStyle/>
+          <a:p>
+            <a:pPr algn="ctr"/>
+            <a:r>
+              <a:rPr lang="en-US" sz="1000" dirty="0" err="1">
+                <a:latin typeface="Arial" panose="020B0604020202020204" pitchFamily="34" charset="0"/>
+                <a:cs typeface="Arial" panose="020B0604020202020204" pitchFamily="34" charset="0"/>
+              </a:rPr>
+              <a:t>mw_rest_client</a:t>
+            </a:r>
+            <a:endParaRPr lang="en-GB" sz="1000" dirty="0">
+              <a:latin typeface="Arial" panose="020B0604020202020204" pitchFamily="34" charset="0"/>
+              <a:cs typeface="Arial" panose="020B0604020202020204" pitchFamily="34" charset="0"/>
+            </a:endParaRPr>
+          </a:p>
+        </p:txBody>
+      </p:sp>
+      <p:sp>
+        <p:nvSpPr>
+          <p:cNvPr id="20" name="TextBox 19">
+            <a:extLst>
+              <a:ext uri="{FF2B5EF4-FFF2-40B4-BE49-F238E27FC236}">
+                <a16:creationId xmlns:a16="http://schemas.microsoft.com/office/drawing/2014/main" id="{9B7F398F-17E5-E044-325F-4BBB70EDB0C3}"/>
+              </a:ext>
+            </a:extLst>
+          </p:cNvPr>
+          <p:cNvSpPr txBox="1"/>
+          <p:nvPr/>
+        </p:nvSpPr>
+        <p:spPr>
+          <a:xfrm>
+            <a:off x="6307906" y="1512644"/>
+            <a:ext cx="1606934" cy="246221"/>
+          </a:xfrm>
+          <a:prstGeom prst="rect">
+            <a:avLst/>
+          </a:prstGeom>
+        </p:spPr>
+        <p:style>
+          <a:lnRef idx="1">
+            <a:schemeClr val="accent4"/>
+          </a:lnRef>
+          <a:fillRef idx="2">
+            <a:schemeClr val="accent4"/>
+          </a:fillRef>
+          <a:effectRef idx="1">
+            <a:schemeClr val="accent4"/>
+          </a:effectRef>
+          <a:fontRef idx="minor">
+            <a:schemeClr val="dk1"/>
+          </a:fontRef>
+        </p:style>
+        <p:txBody>
+          <a:bodyPr wrap="square" anchor="ctr">
+            <a:spAutoFit/>
+          </a:bodyPr>
+          <a:lstStyle/>
+          <a:p>
+            <a:pPr algn="ctr"/>
+            <a:r>
+              <a:rPr lang="en-GB" sz="1000" dirty="0"/>
+              <a:t>API Request Functions</a:t>
+            </a:r>
+          </a:p>
+        </p:txBody>
+      </p:sp>
+      <p:sp>
+        <p:nvSpPr>
+          <p:cNvPr id="29" name="TextBox 28">
+            <a:extLst>
+              <a:ext uri="{FF2B5EF4-FFF2-40B4-BE49-F238E27FC236}">
+                <a16:creationId xmlns:a16="http://schemas.microsoft.com/office/drawing/2014/main" id="{7ED0295A-C654-864F-7ADC-D7860EC238B5}"/>
+              </a:ext>
+            </a:extLst>
+          </p:cNvPr>
+          <p:cNvSpPr txBox="1"/>
+          <p:nvPr/>
+        </p:nvSpPr>
+        <p:spPr>
+          <a:xfrm>
+            <a:off x="6265206" y="2117308"/>
+            <a:ext cx="1692334" cy="246221"/>
+          </a:xfrm>
+          <a:prstGeom prst="rect">
+            <a:avLst/>
+          </a:prstGeom>
+        </p:spPr>
+        <p:style>
+          <a:lnRef idx="1">
+            <a:schemeClr val="accent4"/>
+          </a:lnRef>
+          <a:fillRef idx="2">
+            <a:schemeClr val="accent4"/>
+          </a:fillRef>
+          <a:effectRef idx="1">
+            <a:schemeClr val="accent4"/>
+          </a:effectRef>
+          <a:fontRef idx="minor">
+            <a:schemeClr val="dk1"/>
+          </a:fontRef>
+        </p:style>
+        <p:txBody>
+          <a:bodyPr wrap="square" anchor="ctr">
+            <a:spAutoFit/>
+          </a:bodyPr>
+          <a:lstStyle/>
+          <a:p>
+            <a:pPr algn="ctr"/>
+            <a:r>
+              <a:rPr lang="en-GB" sz="1000" dirty="0" err="1"/>
+              <a:t>mw_request</a:t>
+            </a:r>
+            <a:r>
+              <a:rPr lang="en-GB" sz="1000" dirty="0"/>
+              <a:t> - Internal</a:t>
+            </a:r>
+          </a:p>
+        </p:txBody>
+      </p:sp>
+      <p:sp>
+        <p:nvSpPr>
+          <p:cNvPr id="35" name="TextBox 34">
+            <a:extLst>
+              <a:ext uri="{FF2B5EF4-FFF2-40B4-BE49-F238E27FC236}">
+                <a16:creationId xmlns:a16="http://schemas.microsoft.com/office/drawing/2014/main" id="{9C16751D-4265-DA76-E80F-AE0C0DFD2716}"/>
+              </a:ext>
+            </a:extLst>
+          </p:cNvPr>
+          <p:cNvSpPr txBox="1"/>
+          <p:nvPr/>
+        </p:nvSpPr>
+        <p:spPr>
+          <a:xfrm>
+            <a:off x="6555565" y="2721972"/>
+            <a:ext cx="1111617" cy="246221"/>
+          </a:xfrm>
+          <a:prstGeom prst="rect">
+            <a:avLst/>
+          </a:prstGeom>
+        </p:spPr>
+        <p:style>
+          <a:lnRef idx="1">
+            <a:schemeClr val="accent4"/>
+          </a:lnRef>
+          <a:fillRef idx="2">
+            <a:schemeClr val="accent4"/>
+          </a:fillRef>
+          <a:effectRef idx="1">
+            <a:schemeClr val="accent4"/>
+          </a:effectRef>
+          <a:fontRef idx="minor">
+            <a:schemeClr val="dk1"/>
+          </a:fontRef>
+        </p:style>
+        <p:txBody>
+          <a:bodyPr wrap="square" anchor="ctr">
+            <a:spAutoFit/>
+          </a:bodyPr>
+          <a:lstStyle/>
+          <a:p>
+            <a:pPr algn="ctr"/>
+            <a:r>
+              <a:rPr lang="en-GB" sz="1000" dirty="0"/>
+              <a:t>httr2::request</a:t>
+            </a:r>
+          </a:p>
+        </p:txBody>
+      </p:sp>
+      <p:sp>
+        <p:nvSpPr>
+          <p:cNvPr id="39" name="TextBox 38">
+            <a:extLst>
+              <a:ext uri="{FF2B5EF4-FFF2-40B4-BE49-F238E27FC236}">
+                <a16:creationId xmlns:a16="http://schemas.microsoft.com/office/drawing/2014/main" id="{C47F2F04-237D-D426-1680-D7EBE6955A93}"/>
+              </a:ext>
+            </a:extLst>
+          </p:cNvPr>
+          <p:cNvSpPr txBox="1"/>
+          <p:nvPr/>
+        </p:nvSpPr>
+        <p:spPr>
+          <a:xfrm>
+            <a:off x="6398999" y="3326636"/>
+            <a:ext cx="1424749" cy="246221"/>
+          </a:xfrm>
+          <a:prstGeom prst="rect">
+            <a:avLst/>
+          </a:prstGeom>
+        </p:spPr>
+        <p:style>
+          <a:lnRef idx="1">
+            <a:schemeClr val="accent4"/>
+          </a:lnRef>
+          <a:fillRef idx="2">
+            <a:schemeClr val="accent4"/>
+          </a:fillRef>
+          <a:effectRef idx="1">
+            <a:schemeClr val="accent4"/>
+          </a:effectRef>
+          <a:fontRef idx="minor">
+            <a:schemeClr val="dk1"/>
+          </a:fontRef>
+        </p:style>
+        <p:txBody>
+          <a:bodyPr wrap="square" anchor="ctr">
+            <a:spAutoFit/>
+          </a:bodyPr>
+          <a:lstStyle/>
+          <a:p>
+            <a:pPr algn="ctr"/>
+            <a:r>
+              <a:rPr lang="en-GB" sz="1000" dirty="0"/>
+              <a:t>REST API Response</a:t>
+            </a:r>
+          </a:p>
+        </p:txBody>
+      </p:sp>
+      <p:sp>
+        <p:nvSpPr>
+          <p:cNvPr id="43" name="TextBox 42">
+            <a:extLst>
+              <a:ext uri="{FF2B5EF4-FFF2-40B4-BE49-F238E27FC236}">
+                <a16:creationId xmlns:a16="http://schemas.microsoft.com/office/drawing/2014/main" id="{FD2001D6-40E8-2D5C-7DFE-5C9A2B5988F7}"/>
+              </a:ext>
+            </a:extLst>
+          </p:cNvPr>
+          <p:cNvSpPr txBox="1"/>
+          <p:nvPr/>
+        </p:nvSpPr>
+        <p:spPr>
+          <a:xfrm>
+            <a:off x="6398999" y="3931300"/>
+            <a:ext cx="1424749" cy="246221"/>
+          </a:xfrm>
+          <a:prstGeom prst="rect">
+            <a:avLst/>
+          </a:prstGeom>
+        </p:spPr>
+        <p:style>
+          <a:lnRef idx="1">
+            <a:schemeClr val="accent4"/>
+          </a:lnRef>
+          <a:fillRef idx="2">
+            <a:schemeClr val="accent4"/>
+          </a:fillRef>
+          <a:effectRef idx="1">
+            <a:schemeClr val="accent4"/>
+          </a:effectRef>
+          <a:fontRef idx="minor">
+            <a:schemeClr val="dk1"/>
+          </a:fontRef>
+        </p:style>
+        <p:txBody>
+          <a:bodyPr wrap="square" anchor="ctr">
+            <a:spAutoFit/>
+          </a:bodyPr>
+          <a:lstStyle/>
+          <a:p>
+            <a:pPr algn="ctr"/>
+            <a:r>
+              <a:rPr lang="en-GB" sz="1000" dirty="0"/>
+              <a:t>Response Parsing</a:t>
+            </a:r>
+          </a:p>
+        </p:txBody>
+      </p:sp>
+      <p:sp>
+        <p:nvSpPr>
+          <p:cNvPr id="47" name="TextBox 46">
+            <a:extLst>
+              <a:ext uri="{FF2B5EF4-FFF2-40B4-BE49-F238E27FC236}">
+                <a16:creationId xmlns:a16="http://schemas.microsoft.com/office/drawing/2014/main" id="{F593BC3B-1DC1-3269-4702-07604A6DCD96}"/>
+              </a:ext>
+            </a:extLst>
+          </p:cNvPr>
+          <p:cNvSpPr txBox="1"/>
+          <p:nvPr/>
+        </p:nvSpPr>
+        <p:spPr>
+          <a:xfrm>
+            <a:off x="6441699" y="4535965"/>
+            <a:ext cx="1339348" cy="246221"/>
+          </a:xfrm>
+          <a:prstGeom prst="rect">
+            <a:avLst/>
+          </a:prstGeom>
+        </p:spPr>
+        <p:style>
+          <a:lnRef idx="1">
+            <a:schemeClr val="accent4"/>
+          </a:lnRef>
+          <a:fillRef idx="2">
+            <a:schemeClr val="accent4"/>
+          </a:fillRef>
+          <a:effectRef idx="1">
+            <a:schemeClr val="accent4"/>
+          </a:effectRef>
+          <a:fontRef idx="minor">
+            <a:schemeClr val="dk1"/>
+          </a:fontRef>
+        </p:style>
+        <p:txBody>
+          <a:bodyPr wrap="square" anchor="ctr">
+            <a:spAutoFit/>
+          </a:bodyPr>
+          <a:lstStyle/>
+          <a:p>
+            <a:pPr algn="ctr"/>
+            <a:r>
+              <a:rPr lang="en-GB" sz="1000" dirty="0" err="1"/>
+              <a:t>response_to_df</a:t>
+            </a:r>
+            <a:endParaRPr lang="en-GB" sz="1000" dirty="0"/>
+          </a:p>
+        </p:txBody>
+      </p:sp>
+      <p:sp>
+        <p:nvSpPr>
+          <p:cNvPr id="54" name="Rectangle 53">
+            <a:extLst>
+              <a:ext uri="{FF2B5EF4-FFF2-40B4-BE49-F238E27FC236}">
+                <a16:creationId xmlns:a16="http://schemas.microsoft.com/office/drawing/2014/main" id="{A32BDA2B-D381-CA53-8D0B-16F53D308D52}"/>
+              </a:ext>
+            </a:extLst>
+          </p:cNvPr>
+          <p:cNvSpPr/>
+          <p:nvPr/>
+        </p:nvSpPr>
+        <p:spPr>
+          <a:xfrm>
+            <a:off x="9339380" y="2213361"/>
+            <a:ext cx="1117963" cy="419345"/>
+          </a:xfrm>
+          <a:prstGeom prst="rect">
+            <a:avLst/>
+          </a:prstGeom>
+          <a:solidFill>
+            <a:schemeClr val="accent2">
+              <a:lumMod val="20000"/>
+              <a:lumOff val="80000"/>
+            </a:schemeClr>
+          </a:solidFill>
+        </p:spPr>
+        <p:style>
+          <a:lnRef idx="2">
+            <a:schemeClr val="accent1">
+              <a:shade val="15000"/>
+            </a:schemeClr>
+          </a:lnRef>
+          <a:fillRef idx="1">
+            <a:schemeClr val="accent1"/>
+          </a:fillRef>
+          <a:effectRef idx="0">
+            <a:schemeClr val="accent1"/>
+          </a:effectRef>
+          <a:fontRef idx="minor">
+            <a:schemeClr val="lt1"/>
+          </a:fontRef>
+        </p:style>
+        <p:txBody>
+          <a:bodyPr rtlCol="0" anchor="ctr"/>
+          <a:lstStyle/>
+          <a:p>
+            <a:pPr algn="ctr"/>
+            <a:r>
+              <a:rPr lang="en-GB" sz="1000" b="1" dirty="0">
+                <a:solidFill>
+                  <a:schemeClr val="tx1"/>
+                </a:solidFill>
+              </a:rPr>
+              <a:t>Raw Response</a:t>
+            </a:r>
+          </a:p>
+        </p:txBody>
+      </p:sp>
+      <p:sp>
+        <p:nvSpPr>
+          <p:cNvPr id="55" name="Flowchart: Decision 54">
+            <a:extLst>
+              <a:ext uri="{FF2B5EF4-FFF2-40B4-BE49-F238E27FC236}">
+                <a16:creationId xmlns:a16="http://schemas.microsoft.com/office/drawing/2014/main" id="{4624CF8C-6C7C-BD6F-A8A9-E0E85535BBE6}"/>
+              </a:ext>
+            </a:extLst>
+          </p:cNvPr>
+          <p:cNvSpPr/>
+          <p:nvPr/>
+        </p:nvSpPr>
+        <p:spPr>
+          <a:xfrm>
+            <a:off x="9114985" y="3359132"/>
+            <a:ext cx="1558707" cy="504156"/>
+          </a:xfrm>
+          <a:prstGeom prst="flowChartDecision">
+            <a:avLst/>
+          </a:prstGeom>
+          <a:solidFill>
+            <a:schemeClr val="accent2">
+              <a:lumMod val="20000"/>
+              <a:lumOff val="80000"/>
+            </a:schemeClr>
+          </a:solidFill>
+        </p:spPr>
+        <p:style>
+          <a:lnRef idx="2">
+            <a:schemeClr val="accent1">
+              <a:shade val="15000"/>
+            </a:schemeClr>
+          </a:lnRef>
+          <a:fillRef idx="1">
+            <a:schemeClr val="accent1"/>
+          </a:fillRef>
+          <a:effectRef idx="0">
+            <a:schemeClr val="accent1"/>
+          </a:effectRef>
+          <a:fontRef idx="minor">
+            <a:schemeClr val="lt1"/>
+          </a:fontRef>
+        </p:style>
+        <p:txBody>
+          <a:bodyPr rtlCol="0" anchor="ctr"/>
+          <a:lstStyle/>
+          <a:p>
+            <a:pPr algn="ctr"/>
+            <a:r>
+              <a:rPr lang="en-GB" sz="1000" b="1" dirty="0">
+                <a:solidFill>
+                  <a:schemeClr val="tx1"/>
+                </a:solidFill>
+              </a:rPr>
+              <a:t>Response Type?</a:t>
+            </a:r>
+          </a:p>
+        </p:txBody>
+      </p:sp>
+      <p:sp>
+        <p:nvSpPr>
+          <p:cNvPr id="59" name="TextBox 58">
+            <a:extLst>
+              <a:ext uri="{FF2B5EF4-FFF2-40B4-BE49-F238E27FC236}">
+                <a16:creationId xmlns:a16="http://schemas.microsoft.com/office/drawing/2014/main" id="{B4BF1738-86CC-252B-83E3-1A59967E77E0}"/>
+              </a:ext>
+            </a:extLst>
+          </p:cNvPr>
+          <p:cNvSpPr txBox="1"/>
+          <p:nvPr/>
+        </p:nvSpPr>
+        <p:spPr>
+          <a:xfrm>
+            <a:off x="8184018" y="3784714"/>
+            <a:ext cx="667173" cy="246221"/>
+          </a:xfrm>
+          <a:prstGeom prst="rect">
+            <a:avLst/>
+          </a:prstGeom>
+          <a:noFill/>
+        </p:spPr>
+        <p:txBody>
+          <a:bodyPr wrap="square">
+            <a:spAutoFit/>
+          </a:bodyPr>
+          <a:lstStyle/>
+          <a:p>
+            <a:pPr algn="ctr"/>
+            <a:r>
+              <a:rPr lang="en-GB" sz="1000" dirty="0"/>
+              <a:t>Flat List</a:t>
+            </a:r>
+          </a:p>
+        </p:txBody>
+      </p:sp>
+      <p:sp>
+        <p:nvSpPr>
+          <p:cNvPr id="63" name="TextBox 62">
+            <a:extLst>
+              <a:ext uri="{FF2B5EF4-FFF2-40B4-BE49-F238E27FC236}">
+                <a16:creationId xmlns:a16="http://schemas.microsoft.com/office/drawing/2014/main" id="{686D586A-CEE7-1DC4-3D4E-59983A6EDA31}"/>
+              </a:ext>
+            </a:extLst>
+          </p:cNvPr>
+          <p:cNvSpPr txBox="1"/>
+          <p:nvPr/>
+        </p:nvSpPr>
+        <p:spPr>
+          <a:xfrm>
+            <a:off x="7940006" y="4567914"/>
+            <a:ext cx="949617" cy="246221"/>
+          </a:xfrm>
+          <a:prstGeom prst="rect">
+            <a:avLst/>
+          </a:prstGeom>
+        </p:spPr>
+        <p:style>
+          <a:lnRef idx="1">
+            <a:schemeClr val="accent6"/>
+          </a:lnRef>
+          <a:fillRef idx="2">
+            <a:schemeClr val="accent6"/>
+          </a:fillRef>
+          <a:effectRef idx="1">
+            <a:schemeClr val="accent6"/>
+          </a:effectRef>
+          <a:fontRef idx="minor">
+            <a:schemeClr val="dk1"/>
+          </a:fontRef>
+        </p:style>
+        <p:txBody>
+          <a:bodyPr wrap="square">
+            <a:spAutoFit/>
+          </a:bodyPr>
+          <a:lstStyle/>
+          <a:p>
+            <a:pPr algn="ctr"/>
+            <a:r>
+              <a:rPr lang="en-GB" sz="1000" b="1" dirty="0" err="1"/>
+              <a:t>as_tibble</a:t>
+            </a:r>
+            <a:endParaRPr lang="en-GB" sz="1000" b="1" dirty="0"/>
+          </a:p>
+        </p:txBody>
+      </p:sp>
+      <p:sp>
+        <p:nvSpPr>
+          <p:cNvPr id="67" name="TextBox 66">
+            <a:extLst>
+              <a:ext uri="{FF2B5EF4-FFF2-40B4-BE49-F238E27FC236}">
+                <a16:creationId xmlns:a16="http://schemas.microsoft.com/office/drawing/2014/main" id="{F8D30810-1338-63E5-1B84-E98DFE3801CC}"/>
+              </a:ext>
+            </a:extLst>
+          </p:cNvPr>
+          <p:cNvSpPr txBox="1"/>
+          <p:nvPr/>
+        </p:nvSpPr>
+        <p:spPr>
+          <a:xfrm>
+            <a:off x="8677187" y="4221894"/>
+            <a:ext cx="909156" cy="246221"/>
+          </a:xfrm>
+          <a:prstGeom prst="rect">
+            <a:avLst/>
+          </a:prstGeom>
+          <a:noFill/>
+        </p:spPr>
+        <p:txBody>
+          <a:bodyPr wrap="square">
+            <a:spAutoFit/>
+          </a:bodyPr>
+          <a:lstStyle/>
+          <a:p>
+            <a:pPr algn="ctr"/>
+            <a:r>
+              <a:rPr lang="en-GB" sz="1000" dirty="0"/>
+              <a:t>Row Pattern</a:t>
+            </a:r>
+          </a:p>
+        </p:txBody>
+      </p:sp>
+      <p:sp>
+        <p:nvSpPr>
+          <p:cNvPr id="71" name="TextBox 70">
+            <a:extLst>
+              <a:ext uri="{FF2B5EF4-FFF2-40B4-BE49-F238E27FC236}">
+                <a16:creationId xmlns:a16="http://schemas.microsoft.com/office/drawing/2014/main" id="{10B46C2A-85C5-F36A-FA01-E3FA5CD45B19}"/>
+              </a:ext>
+            </a:extLst>
+          </p:cNvPr>
+          <p:cNvSpPr txBox="1"/>
+          <p:nvPr/>
+        </p:nvSpPr>
+        <p:spPr>
+          <a:xfrm>
+            <a:off x="8511607" y="4928587"/>
+            <a:ext cx="1492390" cy="246221"/>
+          </a:xfrm>
+          <a:prstGeom prst="rect">
+            <a:avLst/>
+          </a:prstGeom>
+        </p:spPr>
+        <p:style>
+          <a:lnRef idx="1">
+            <a:schemeClr val="accent6"/>
+          </a:lnRef>
+          <a:fillRef idx="2">
+            <a:schemeClr val="accent6"/>
+          </a:fillRef>
+          <a:effectRef idx="1">
+            <a:schemeClr val="accent6"/>
+          </a:effectRef>
+          <a:fontRef idx="minor">
+            <a:schemeClr val="dk1"/>
+          </a:fontRef>
+        </p:style>
+        <p:txBody>
+          <a:bodyPr wrap="square">
+            <a:spAutoFit/>
+          </a:bodyPr>
+          <a:lstStyle/>
+          <a:p>
+            <a:pPr algn="ctr"/>
+            <a:r>
+              <a:rPr lang="en-US" sz="1000" b="1" dirty="0" err="1"/>
+              <a:t>list_rbind</a:t>
+            </a:r>
+            <a:r>
+              <a:rPr lang="en-US" sz="1000" b="1" dirty="0"/>
+              <a:t> with </a:t>
+            </a:r>
+            <a:r>
+              <a:rPr lang="en-US" sz="1000" b="1" dirty="0" err="1"/>
+              <a:t>row_id</a:t>
+            </a:r>
+            <a:endParaRPr lang="en-GB" sz="1000" b="1" dirty="0"/>
+          </a:p>
+        </p:txBody>
+      </p:sp>
+      <p:sp>
+        <p:nvSpPr>
+          <p:cNvPr id="75" name="TextBox 74">
+            <a:extLst>
+              <a:ext uri="{FF2B5EF4-FFF2-40B4-BE49-F238E27FC236}">
+                <a16:creationId xmlns:a16="http://schemas.microsoft.com/office/drawing/2014/main" id="{628013F4-1ABC-BF96-C8EB-449127A271E6}"/>
+              </a:ext>
+            </a:extLst>
+          </p:cNvPr>
+          <p:cNvSpPr txBox="1"/>
+          <p:nvPr/>
+        </p:nvSpPr>
+        <p:spPr>
+          <a:xfrm>
+            <a:off x="10247586" y="4220995"/>
+            <a:ext cx="1078511" cy="246221"/>
+          </a:xfrm>
+          <a:prstGeom prst="rect">
+            <a:avLst/>
+          </a:prstGeom>
+          <a:noFill/>
+        </p:spPr>
+        <p:txBody>
+          <a:bodyPr wrap="square">
+            <a:spAutoFit/>
+          </a:bodyPr>
+          <a:lstStyle/>
+          <a:p>
+            <a:pPr algn="ctr"/>
+            <a:r>
+              <a:rPr lang="en-GB" sz="1000" dirty="0"/>
+              <a:t>DATA Nested</a:t>
+            </a:r>
+          </a:p>
+        </p:txBody>
+      </p:sp>
+      <p:sp>
+        <p:nvSpPr>
+          <p:cNvPr id="79" name="TextBox 78">
+            <a:extLst>
+              <a:ext uri="{FF2B5EF4-FFF2-40B4-BE49-F238E27FC236}">
+                <a16:creationId xmlns:a16="http://schemas.microsoft.com/office/drawing/2014/main" id="{FB3FDC7E-B409-C260-0B96-80E60AFC1DF1}"/>
+              </a:ext>
+            </a:extLst>
+          </p:cNvPr>
+          <p:cNvSpPr txBox="1"/>
+          <p:nvPr/>
+        </p:nvSpPr>
+        <p:spPr>
+          <a:xfrm>
+            <a:off x="10854802" y="3790788"/>
+            <a:ext cx="829471" cy="246221"/>
+          </a:xfrm>
+          <a:prstGeom prst="rect">
+            <a:avLst/>
+          </a:prstGeom>
+          <a:noFill/>
+        </p:spPr>
+        <p:txBody>
+          <a:bodyPr wrap="square">
+            <a:spAutoFit/>
+          </a:bodyPr>
+          <a:lstStyle/>
+          <a:p>
+            <a:pPr algn="ctr"/>
+            <a:r>
+              <a:rPr lang="en-GB" sz="1000" dirty="0"/>
+              <a:t>List of Lists</a:t>
+            </a:r>
+          </a:p>
+        </p:txBody>
+      </p:sp>
+      <p:sp>
+        <p:nvSpPr>
+          <p:cNvPr id="83" name="TextBox 82">
+            <a:extLst>
+              <a:ext uri="{FF2B5EF4-FFF2-40B4-BE49-F238E27FC236}">
+                <a16:creationId xmlns:a16="http://schemas.microsoft.com/office/drawing/2014/main" id="{E81C32C3-12B6-8C81-5D6C-0C262A27EA0F}"/>
+              </a:ext>
+            </a:extLst>
+          </p:cNvPr>
+          <p:cNvSpPr txBox="1"/>
+          <p:nvPr/>
+        </p:nvSpPr>
+        <p:spPr>
+          <a:xfrm>
+            <a:off x="10942878" y="4581547"/>
+            <a:ext cx="1194110" cy="246221"/>
+          </a:xfrm>
+          <a:prstGeom prst="rect">
+            <a:avLst/>
+          </a:prstGeom>
+        </p:spPr>
+        <p:style>
+          <a:lnRef idx="1">
+            <a:schemeClr val="accent6"/>
+          </a:lnRef>
+          <a:fillRef idx="2">
+            <a:schemeClr val="accent6"/>
+          </a:fillRef>
+          <a:effectRef idx="1">
+            <a:schemeClr val="accent6"/>
+          </a:effectRef>
+          <a:fontRef idx="minor">
+            <a:schemeClr val="dk1"/>
+          </a:fontRef>
+        </p:style>
+        <p:txBody>
+          <a:bodyPr wrap="square">
+            <a:spAutoFit/>
+          </a:bodyPr>
+          <a:lstStyle/>
+          <a:p>
+            <a:pPr algn="ctr"/>
+            <a:r>
+              <a:rPr lang="en-GB" sz="1000" b="1" dirty="0"/>
+              <a:t>map + </a:t>
+            </a:r>
+            <a:r>
+              <a:rPr lang="en-GB" sz="1000" b="1" dirty="0" err="1"/>
+              <a:t>list_rbind</a:t>
+            </a:r>
+            <a:endParaRPr lang="en-GB" sz="1000" b="1" dirty="0"/>
+          </a:p>
+        </p:txBody>
+      </p:sp>
+      <p:sp>
+        <p:nvSpPr>
+          <p:cNvPr id="87" name="Rectangle: Rounded Corners 86">
+            <a:extLst>
+              <a:ext uri="{FF2B5EF4-FFF2-40B4-BE49-F238E27FC236}">
+                <a16:creationId xmlns:a16="http://schemas.microsoft.com/office/drawing/2014/main" id="{E1B3D64C-FE1E-D672-1E5F-E43F316CBDCA}"/>
+              </a:ext>
+            </a:extLst>
+          </p:cNvPr>
+          <p:cNvSpPr/>
+          <p:nvPr/>
+        </p:nvSpPr>
+        <p:spPr>
+          <a:xfrm>
+            <a:off x="9074448" y="5851667"/>
+            <a:ext cx="1946858" cy="246221"/>
+          </a:xfrm>
+          <a:prstGeom prst="roundRect">
+            <a:avLst/>
+          </a:prstGeom>
+          <a:solidFill>
+            <a:schemeClr val="accent2">
+              <a:lumMod val="20000"/>
+              <a:lumOff val="80000"/>
+            </a:schemeClr>
+          </a:solidFill>
+        </p:spPr>
+        <p:style>
+          <a:lnRef idx="2">
+            <a:schemeClr val="accent1">
+              <a:shade val="15000"/>
+            </a:schemeClr>
+          </a:lnRef>
+          <a:fillRef idx="1">
+            <a:schemeClr val="accent1"/>
+          </a:fillRef>
+          <a:effectRef idx="0">
+            <a:schemeClr val="accent1"/>
+          </a:effectRef>
+          <a:fontRef idx="minor">
+            <a:schemeClr val="lt1"/>
+          </a:fontRef>
+        </p:style>
+        <p:txBody>
+          <a:bodyPr rtlCol="0" anchor="ctr"/>
+          <a:lstStyle/>
+          <a:p>
+            <a:pPr algn="ctr"/>
+            <a:r>
+              <a:rPr lang="en-GB" sz="1000" b="1" dirty="0">
+                <a:solidFill>
+                  <a:schemeClr val="tx1"/>
+                </a:solidFill>
+              </a:rPr>
+              <a:t>Tibble Output</a:t>
+            </a:r>
+          </a:p>
+        </p:txBody>
+      </p:sp>
+      <p:sp>
+        <p:nvSpPr>
+          <p:cNvPr id="91" name="TextBox 90">
+            <a:extLst>
+              <a:ext uri="{FF2B5EF4-FFF2-40B4-BE49-F238E27FC236}">
+                <a16:creationId xmlns:a16="http://schemas.microsoft.com/office/drawing/2014/main" id="{D977B674-DCE8-92D4-C825-00E76021DE0F}"/>
+              </a:ext>
+            </a:extLst>
+          </p:cNvPr>
+          <p:cNvSpPr txBox="1"/>
+          <p:nvPr/>
+        </p:nvSpPr>
+        <p:spPr>
+          <a:xfrm>
+            <a:off x="10110507" y="4930312"/>
+            <a:ext cx="1332309" cy="246221"/>
+          </a:xfrm>
+          <a:prstGeom prst="rect">
+            <a:avLst/>
+          </a:prstGeom>
+        </p:spPr>
+        <p:style>
+          <a:lnRef idx="1">
+            <a:schemeClr val="accent6"/>
+          </a:lnRef>
+          <a:fillRef idx="2">
+            <a:schemeClr val="accent6"/>
+          </a:fillRef>
+          <a:effectRef idx="1">
+            <a:schemeClr val="accent6"/>
+          </a:effectRef>
+          <a:fontRef idx="minor">
+            <a:schemeClr val="dk1"/>
+          </a:fontRef>
+        </p:style>
+        <p:txBody>
+          <a:bodyPr wrap="square">
+            <a:spAutoFit/>
+          </a:bodyPr>
+          <a:lstStyle/>
+          <a:p>
+            <a:pPr algn="ctr"/>
+            <a:r>
+              <a:rPr lang="en-GB" sz="1000" b="1" dirty="0" err="1"/>
+              <a:t>flatten_entry</a:t>
+            </a:r>
+            <a:endParaRPr lang="en-GB" sz="1000" b="1" dirty="0"/>
+          </a:p>
+        </p:txBody>
+      </p:sp>
+      <p:cxnSp>
+        <p:nvCxnSpPr>
+          <p:cNvPr id="93" name="Straight Arrow Connector 92">
+            <a:extLst>
+              <a:ext uri="{FF2B5EF4-FFF2-40B4-BE49-F238E27FC236}">
+                <a16:creationId xmlns:a16="http://schemas.microsoft.com/office/drawing/2014/main" id="{F03F2497-164F-31B2-2086-98E9EC02F5A4}"/>
+              </a:ext>
+            </a:extLst>
+          </p:cNvPr>
+          <p:cNvCxnSpPr>
+            <a:stCxn id="12" idx="2"/>
+            <a:endCxn id="20" idx="0"/>
+          </p:cNvCxnSpPr>
+          <p:nvPr/>
+        </p:nvCxnSpPr>
+        <p:spPr>
+          <a:xfrm flipH="1">
+            <a:off x="7111373" y="1215757"/>
+            <a:ext cx="1" cy="296887"/>
+          </a:xfrm>
+          <a:prstGeom prst="straightConnector1">
+            <a:avLst/>
+          </a:prstGeom>
+          <a:ln>
+            <a:tailEnd type="triangle"/>
+          </a:ln>
+        </p:spPr>
+        <p:style>
+          <a:lnRef idx="2">
+            <a:schemeClr val="accent1"/>
+          </a:lnRef>
+          <a:fillRef idx="0">
+            <a:schemeClr val="accent1"/>
+          </a:fillRef>
+          <a:effectRef idx="1">
+            <a:schemeClr val="accent1"/>
+          </a:effectRef>
+          <a:fontRef idx="minor">
+            <a:schemeClr val="tx1"/>
+          </a:fontRef>
+        </p:style>
+      </p:cxnSp>
+      <p:cxnSp>
+        <p:nvCxnSpPr>
+          <p:cNvPr id="95" name="Straight Arrow Connector 94">
+            <a:extLst>
+              <a:ext uri="{FF2B5EF4-FFF2-40B4-BE49-F238E27FC236}">
+                <a16:creationId xmlns:a16="http://schemas.microsoft.com/office/drawing/2014/main" id="{8F4A5E22-2D73-D2FD-21F5-DFDADDB44A5A}"/>
+              </a:ext>
+            </a:extLst>
+          </p:cNvPr>
+          <p:cNvCxnSpPr>
+            <a:stCxn id="20" idx="2"/>
+            <a:endCxn id="29" idx="0"/>
+          </p:cNvCxnSpPr>
+          <p:nvPr/>
+        </p:nvCxnSpPr>
+        <p:spPr>
+          <a:xfrm>
+            <a:off x="7111373" y="1758865"/>
+            <a:ext cx="0" cy="358443"/>
+          </a:xfrm>
+          <a:prstGeom prst="straightConnector1">
+            <a:avLst/>
+          </a:prstGeom>
+          <a:ln>
+            <a:tailEnd type="triangle"/>
+          </a:ln>
+        </p:spPr>
+        <p:style>
+          <a:lnRef idx="2">
+            <a:schemeClr val="accent1"/>
+          </a:lnRef>
+          <a:fillRef idx="0">
+            <a:schemeClr val="accent1"/>
+          </a:fillRef>
+          <a:effectRef idx="1">
+            <a:schemeClr val="accent1"/>
+          </a:effectRef>
+          <a:fontRef idx="minor">
+            <a:schemeClr val="tx1"/>
+          </a:fontRef>
+        </p:style>
+      </p:cxnSp>
+      <p:cxnSp>
+        <p:nvCxnSpPr>
+          <p:cNvPr id="97" name="Straight Arrow Connector 96">
+            <a:extLst>
+              <a:ext uri="{FF2B5EF4-FFF2-40B4-BE49-F238E27FC236}">
+                <a16:creationId xmlns:a16="http://schemas.microsoft.com/office/drawing/2014/main" id="{55C59D6D-12EE-EB1F-B2CA-19917AE36168}"/>
+              </a:ext>
+            </a:extLst>
+          </p:cNvPr>
+          <p:cNvCxnSpPr>
+            <a:stCxn id="29" idx="2"/>
+            <a:endCxn id="35" idx="0"/>
+          </p:cNvCxnSpPr>
+          <p:nvPr/>
+        </p:nvCxnSpPr>
+        <p:spPr>
+          <a:xfrm>
+            <a:off x="7111373" y="2363529"/>
+            <a:ext cx="1" cy="358443"/>
+          </a:xfrm>
+          <a:prstGeom prst="straightConnector1">
+            <a:avLst/>
+          </a:prstGeom>
+          <a:ln>
+            <a:tailEnd type="triangle"/>
+          </a:ln>
+        </p:spPr>
+        <p:style>
+          <a:lnRef idx="2">
+            <a:schemeClr val="accent1"/>
+          </a:lnRef>
+          <a:fillRef idx="0">
+            <a:schemeClr val="accent1"/>
+          </a:fillRef>
+          <a:effectRef idx="1">
+            <a:schemeClr val="accent1"/>
+          </a:effectRef>
+          <a:fontRef idx="minor">
+            <a:schemeClr val="tx1"/>
+          </a:fontRef>
+        </p:style>
+      </p:cxnSp>
+      <p:cxnSp>
+        <p:nvCxnSpPr>
+          <p:cNvPr id="99" name="Straight Arrow Connector 98">
+            <a:extLst>
+              <a:ext uri="{FF2B5EF4-FFF2-40B4-BE49-F238E27FC236}">
+                <a16:creationId xmlns:a16="http://schemas.microsoft.com/office/drawing/2014/main" id="{A82F4C9A-31DC-8B4F-156B-CA8DECDB053C}"/>
+              </a:ext>
+            </a:extLst>
+          </p:cNvPr>
+          <p:cNvCxnSpPr>
+            <a:stCxn id="35" idx="2"/>
+            <a:endCxn id="39" idx="0"/>
+          </p:cNvCxnSpPr>
+          <p:nvPr/>
+        </p:nvCxnSpPr>
+        <p:spPr>
+          <a:xfrm>
+            <a:off x="7111374" y="2968193"/>
+            <a:ext cx="0" cy="358443"/>
+          </a:xfrm>
+          <a:prstGeom prst="straightConnector1">
+            <a:avLst/>
+          </a:prstGeom>
+          <a:ln>
+            <a:tailEnd type="triangle"/>
+          </a:ln>
+        </p:spPr>
+        <p:style>
+          <a:lnRef idx="2">
+            <a:schemeClr val="accent1"/>
+          </a:lnRef>
+          <a:fillRef idx="0">
+            <a:schemeClr val="accent1"/>
+          </a:fillRef>
+          <a:effectRef idx="1">
+            <a:schemeClr val="accent1"/>
+          </a:effectRef>
+          <a:fontRef idx="minor">
+            <a:schemeClr val="tx1"/>
+          </a:fontRef>
+        </p:style>
+      </p:cxnSp>
+      <p:cxnSp>
+        <p:nvCxnSpPr>
+          <p:cNvPr id="101" name="Straight Arrow Connector 100">
+            <a:extLst>
+              <a:ext uri="{FF2B5EF4-FFF2-40B4-BE49-F238E27FC236}">
+                <a16:creationId xmlns:a16="http://schemas.microsoft.com/office/drawing/2014/main" id="{E91B1816-200E-E204-AC86-16DA52CD2400}"/>
+              </a:ext>
+            </a:extLst>
+          </p:cNvPr>
+          <p:cNvCxnSpPr>
+            <a:stCxn id="39" idx="2"/>
+            <a:endCxn id="43" idx="0"/>
+          </p:cNvCxnSpPr>
+          <p:nvPr/>
+        </p:nvCxnSpPr>
+        <p:spPr>
+          <a:xfrm>
+            <a:off x="7111374" y="3572857"/>
+            <a:ext cx="0" cy="358443"/>
+          </a:xfrm>
+          <a:prstGeom prst="straightConnector1">
+            <a:avLst/>
+          </a:prstGeom>
+          <a:ln>
+            <a:tailEnd type="triangle"/>
+          </a:ln>
+        </p:spPr>
+        <p:style>
+          <a:lnRef idx="2">
+            <a:schemeClr val="accent1"/>
+          </a:lnRef>
+          <a:fillRef idx="0">
+            <a:schemeClr val="accent1"/>
+          </a:fillRef>
+          <a:effectRef idx="1">
+            <a:schemeClr val="accent1"/>
+          </a:effectRef>
+          <a:fontRef idx="minor">
+            <a:schemeClr val="tx1"/>
+          </a:fontRef>
+        </p:style>
+      </p:cxnSp>
+      <p:cxnSp>
+        <p:nvCxnSpPr>
+          <p:cNvPr id="103" name="Straight Arrow Connector 102">
+            <a:extLst>
+              <a:ext uri="{FF2B5EF4-FFF2-40B4-BE49-F238E27FC236}">
+                <a16:creationId xmlns:a16="http://schemas.microsoft.com/office/drawing/2014/main" id="{3BA82C72-AC44-DFCC-1B33-BADDA4916A81}"/>
+              </a:ext>
+            </a:extLst>
+          </p:cNvPr>
+          <p:cNvCxnSpPr>
+            <a:stCxn id="43" idx="2"/>
+            <a:endCxn id="47" idx="0"/>
+          </p:cNvCxnSpPr>
+          <p:nvPr/>
+        </p:nvCxnSpPr>
+        <p:spPr>
+          <a:xfrm flipH="1">
+            <a:off x="7111373" y="4177521"/>
+            <a:ext cx="1" cy="358444"/>
+          </a:xfrm>
+          <a:prstGeom prst="straightConnector1">
+            <a:avLst/>
+          </a:prstGeom>
+          <a:ln>
+            <a:tailEnd type="triangle"/>
+          </a:ln>
+        </p:spPr>
+        <p:style>
+          <a:lnRef idx="2">
+            <a:schemeClr val="accent1"/>
+          </a:lnRef>
+          <a:fillRef idx="0">
+            <a:schemeClr val="accent1"/>
+          </a:fillRef>
+          <a:effectRef idx="1">
+            <a:schemeClr val="accent1"/>
+          </a:effectRef>
+          <a:fontRef idx="minor">
+            <a:schemeClr val="tx1"/>
+          </a:fontRef>
+        </p:style>
+      </p:cxnSp>
+      <p:cxnSp>
+        <p:nvCxnSpPr>
+          <p:cNvPr id="105" name="Connector: Curved 104">
+            <a:extLst>
+              <a:ext uri="{FF2B5EF4-FFF2-40B4-BE49-F238E27FC236}">
+                <a16:creationId xmlns:a16="http://schemas.microsoft.com/office/drawing/2014/main" id="{0A3CF53E-CCD4-CE95-0515-55D910BC9270}"/>
+              </a:ext>
+            </a:extLst>
+          </p:cNvPr>
+          <p:cNvCxnSpPr>
+            <a:cxnSpLocks/>
+            <a:stCxn id="47" idx="2"/>
+            <a:endCxn id="87" idx="1"/>
+          </p:cNvCxnSpPr>
+          <p:nvPr/>
+        </p:nvCxnSpPr>
+        <p:spPr>
+          <a:xfrm rot="16200000" flipH="1">
+            <a:off x="7496614" y="4396944"/>
+            <a:ext cx="1192592" cy="1963075"/>
+          </a:xfrm>
+          <a:prstGeom prst="curvedConnector2">
+            <a:avLst/>
+          </a:prstGeom>
+          <a:ln>
+            <a:tailEnd type="triangle"/>
+          </a:ln>
+        </p:spPr>
+        <p:style>
+          <a:lnRef idx="2">
+            <a:schemeClr val="accent1"/>
+          </a:lnRef>
+          <a:fillRef idx="0">
+            <a:schemeClr val="accent1"/>
+          </a:fillRef>
+          <a:effectRef idx="1">
+            <a:schemeClr val="accent1"/>
+          </a:effectRef>
+          <a:fontRef idx="minor">
+            <a:schemeClr val="tx1"/>
+          </a:fontRef>
+        </p:style>
+      </p:cxnSp>
+      <p:cxnSp>
+        <p:nvCxnSpPr>
+          <p:cNvPr id="107" name="Connector: Curved 106">
+            <a:extLst>
+              <a:ext uri="{FF2B5EF4-FFF2-40B4-BE49-F238E27FC236}">
+                <a16:creationId xmlns:a16="http://schemas.microsoft.com/office/drawing/2014/main" id="{F11C5192-C219-63F8-5DE4-86C2F765D330}"/>
+              </a:ext>
+            </a:extLst>
+          </p:cNvPr>
+          <p:cNvCxnSpPr>
+            <a:cxnSpLocks/>
+            <a:stCxn id="55" idx="1"/>
+            <a:endCxn id="59" idx="3"/>
+          </p:cNvCxnSpPr>
+          <p:nvPr/>
+        </p:nvCxnSpPr>
+        <p:spPr>
+          <a:xfrm rot="10800000" flipV="1">
+            <a:off x="8851191" y="3611209"/>
+            <a:ext cx="263794" cy="296615"/>
+          </a:xfrm>
+          <a:prstGeom prst="curvedConnector3">
+            <a:avLst>
+              <a:gd name="adj1" fmla="val 50000"/>
+            </a:avLst>
+          </a:prstGeom>
+          <a:ln>
+            <a:tailEnd type="triangle"/>
+          </a:ln>
+        </p:spPr>
+        <p:style>
+          <a:lnRef idx="2">
+            <a:schemeClr val="accent1"/>
+          </a:lnRef>
+          <a:fillRef idx="0">
+            <a:schemeClr val="accent1"/>
+          </a:fillRef>
+          <a:effectRef idx="1">
+            <a:schemeClr val="accent1"/>
+          </a:effectRef>
+          <a:fontRef idx="minor">
+            <a:schemeClr val="tx1"/>
+          </a:fontRef>
+        </p:style>
+      </p:cxnSp>
+      <p:cxnSp>
+        <p:nvCxnSpPr>
+          <p:cNvPr id="109" name="Connector: Curved 108">
+            <a:extLst>
+              <a:ext uri="{FF2B5EF4-FFF2-40B4-BE49-F238E27FC236}">
+                <a16:creationId xmlns:a16="http://schemas.microsoft.com/office/drawing/2014/main" id="{99DE1E7A-8EB4-C4D6-373F-7969B4CBF489}"/>
+              </a:ext>
+            </a:extLst>
+          </p:cNvPr>
+          <p:cNvCxnSpPr>
+            <a:cxnSpLocks/>
+            <a:stCxn id="59" idx="1"/>
+            <a:endCxn id="63" idx="0"/>
+          </p:cNvCxnSpPr>
+          <p:nvPr/>
+        </p:nvCxnSpPr>
+        <p:spPr>
+          <a:xfrm rot="10800000" flipH="1" flipV="1">
+            <a:off x="8184017" y="3907824"/>
+            <a:ext cx="230797" cy="660089"/>
+          </a:xfrm>
+          <a:prstGeom prst="curvedConnector4">
+            <a:avLst>
+              <a:gd name="adj1" fmla="val -99048"/>
+              <a:gd name="adj2" fmla="val 59325"/>
+            </a:avLst>
+          </a:prstGeom>
+          <a:ln>
+            <a:tailEnd type="triangle"/>
+          </a:ln>
+        </p:spPr>
+        <p:style>
+          <a:lnRef idx="2">
+            <a:schemeClr val="accent1"/>
+          </a:lnRef>
+          <a:fillRef idx="0">
+            <a:schemeClr val="accent1"/>
+          </a:fillRef>
+          <a:effectRef idx="1">
+            <a:schemeClr val="accent1"/>
+          </a:effectRef>
+          <a:fontRef idx="minor">
+            <a:schemeClr val="tx1"/>
+          </a:fontRef>
+        </p:style>
+      </p:cxnSp>
+      <p:cxnSp>
+        <p:nvCxnSpPr>
+          <p:cNvPr id="124" name="Straight Arrow Connector 123">
+            <a:extLst>
+              <a:ext uri="{FF2B5EF4-FFF2-40B4-BE49-F238E27FC236}">
+                <a16:creationId xmlns:a16="http://schemas.microsoft.com/office/drawing/2014/main" id="{228C9EA9-6941-2409-B31B-4AD27B96B282}"/>
+              </a:ext>
+            </a:extLst>
+          </p:cNvPr>
+          <p:cNvCxnSpPr>
+            <a:cxnSpLocks/>
+            <a:stCxn id="54" idx="2"/>
+            <a:endCxn id="55" idx="0"/>
+          </p:cNvCxnSpPr>
+          <p:nvPr/>
+        </p:nvCxnSpPr>
+        <p:spPr>
+          <a:xfrm flipH="1">
+            <a:off x="9894339" y="2632706"/>
+            <a:ext cx="4023" cy="726426"/>
+          </a:xfrm>
+          <a:prstGeom prst="straightConnector1">
+            <a:avLst/>
+          </a:prstGeom>
+          <a:ln>
+            <a:tailEnd type="triangle"/>
+          </a:ln>
+        </p:spPr>
+        <p:style>
+          <a:lnRef idx="2">
+            <a:schemeClr val="accent1"/>
+          </a:lnRef>
+          <a:fillRef idx="0">
+            <a:schemeClr val="accent1"/>
+          </a:fillRef>
+          <a:effectRef idx="1">
+            <a:schemeClr val="accent1"/>
+          </a:effectRef>
+          <a:fontRef idx="minor">
+            <a:schemeClr val="tx1"/>
+          </a:fontRef>
+        </p:style>
+      </p:cxnSp>
+      <p:cxnSp>
+        <p:nvCxnSpPr>
+          <p:cNvPr id="129" name="Connector: Curved 128">
+            <a:extLst>
+              <a:ext uri="{FF2B5EF4-FFF2-40B4-BE49-F238E27FC236}">
+                <a16:creationId xmlns:a16="http://schemas.microsoft.com/office/drawing/2014/main" id="{5EEDCEE2-46C5-19A3-639F-D28554678CBA}"/>
+              </a:ext>
+            </a:extLst>
+          </p:cNvPr>
+          <p:cNvCxnSpPr>
+            <a:cxnSpLocks/>
+            <a:stCxn id="55" idx="2"/>
+            <a:endCxn id="67" idx="0"/>
+          </p:cNvCxnSpPr>
+          <p:nvPr/>
+        </p:nvCxnSpPr>
+        <p:spPr>
+          <a:xfrm rot="5400000">
+            <a:off x="9333749" y="3661304"/>
+            <a:ext cx="358606" cy="762574"/>
+          </a:xfrm>
+          <a:prstGeom prst="curvedConnector3">
+            <a:avLst/>
+          </a:prstGeom>
+          <a:ln>
+            <a:tailEnd type="triangle"/>
+          </a:ln>
+        </p:spPr>
+        <p:style>
+          <a:lnRef idx="2">
+            <a:schemeClr val="accent1"/>
+          </a:lnRef>
+          <a:fillRef idx="0">
+            <a:schemeClr val="accent1"/>
+          </a:fillRef>
+          <a:effectRef idx="1">
+            <a:schemeClr val="accent1"/>
+          </a:effectRef>
+          <a:fontRef idx="minor">
+            <a:schemeClr val="tx1"/>
+          </a:fontRef>
+        </p:style>
+      </p:cxnSp>
+      <p:cxnSp>
+        <p:nvCxnSpPr>
+          <p:cNvPr id="131" name="Connector: Curved 130">
+            <a:extLst>
+              <a:ext uri="{FF2B5EF4-FFF2-40B4-BE49-F238E27FC236}">
+                <a16:creationId xmlns:a16="http://schemas.microsoft.com/office/drawing/2014/main" id="{85995280-F263-8373-2FE3-8FD7626EF38F}"/>
+              </a:ext>
+            </a:extLst>
+          </p:cNvPr>
+          <p:cNvCxnSpPr>
+            <a:cxnSpLocks/>
+            <a:stCxn id="67" idx="2"/>
+            <a:endCxn id="71" idx="0"/>
+          </p:cNvCxnSpPr>
+          <p:nvPr/>
+        </p:nvCxnSpPr>
+        <p:spPr>
+          <a:xfrm rot="16200000" flipH="1">
+            <a:off x="8964547" y="4635332"/>
+            <a:ext cx="460472" cy="126037"/>
+          </a:xfrm>
+          <a:prstGeom prst="curvedConnector3">
+            <a:avLst/>
+          </a:prstGeom>
+          <a:ln>
+            <a:tailEnd type="triangle"/>
+          </a:ln>
+        </p:spPr>
+        <p:style>
+          <a:lnRef idx="2">
+            <a:schemeClr val="accent1"/>
+          </a:lnRef>
+          <a:fillRef idx="0">
+            <a:schemeClr val="accent1"/>
+          </a:fillRef>
+          <a:effectRef idx="1">
+            <a:schemeClr val="accent1"/>
+          </a:effectRef>
+          <a:fontRef idx="minor">
+            <a:schemeClr val="tx1"/>
+          </a:fontRef>
+        </p:style>
+      </p:cxnSp>
+      <p:cxnSp>
+        <p:nvCxnSpPr>
+          <p:cNvPr id="134" name="Connector: Curved 133">
+            <a:extLst>
+              <a:ext uri="{FF2B5EF4-FFF2-40B4-BE49-F238E27FC236}">
+                <a16:creationId xmlns:a16="http://schemas.microsoft.com/office/drawing/2014/main" id="{225DF22C-7537-9512-6671-33115C85E085}"/>
+              </a:ext>
+            </a:extLst>
+          </p:cNvPr>
+          <p:cNvCxnSpPr>
+            <a:cxnSpLocks/>
+            <a:stCxn id="55" idx="2"/>
+            <a:endCxn id="75" idx="0"/>
+          </p:cNvCxnSpPr>
+          <p:nvPr/>
+        </p:nvCxnSpPr>
+        <p:spPr>
+          <a:xfrm rot="16200000" flipH="1">
+            <a:off x="10161737" y="3595889"/>
+            <a:ext cx="357707" cy="892503"/>
+          </a:xfrm>
+          <a:prstGeom prst="curvedConnector3">
+            <a:avLst/>
+          </a:prstGeom>
+          <a:ln>
+            <a:tailEnd type="triangle"/>
+          </a:ln>
+        </p:spPr>
+        <p:style>
+          <a:lnRef idx="2">
+            <a:schemeClr val="accent1"/>
+          </a:lnRef>
+          <a:fillRef idx="0">
+            <a:schemeClr val="accent1"/>
+          </a:fillRef>
+          <a:effectRef idx="1">
+            <a:schemeClr val="accent1"/>
+          </a:effectRef>
+          <a:fontRef idx="minor">
+            <a:schemeClr val="tx1"/>
+          </a:fontRef>
+        </p:style>
+      </p:cxnSp>
+      <p:cxnSp>
+        <p:nvCxnSpPr>
+          <p:cNvPr id="136" name="Connector: Curved 135">
+            <a:extLst>
+              <a:ext uri="{FF2B5EF4-FFF2-40B4-BE49-F238E27FC236}">
+                <a16:creationId xmlns:a16="http://schemas.microsoft.com/office/drawing/2014/main" id="{0AB3AB48-EC7B-1395-7BA8-8CFCE5B5C8DE}"/>
+              </a:ext>
+            </a:extLst>
+          </p:cNvPr>
+          <p:cNvCxnSpPr>
+            <a:cxnSpLocks/>
+            <a:stCxn id="75" idx="2"/>
+            <a:endCxn id="91" idx="0"/>
+          </p:cNvCxnSpPr>
+          <p:nvPr/>
+        </p:nvCxnSpPr>
+        <p:spPr>
+          <a:xfrm rot="5400000">
+            <a:off x="10550204" y="4693674"/>
+            <a:ext cx="463096" cy="10180"/>
+          </a:xfrm>
+          <a:prstGeom prst="curvedConnector3">
+            <a:avLst/>
+          </a:prstGeom>
+          <a:ln>
+            <a:tailEnd type="triangle"/>
+          </a:ln>
+        </p:spPr>
+        <p:style>
+          <a:lnRef idx="2">
+            <a:schemeClr val="accent1"/>
+          </a:lnRef>
+          <a:fillRef idx="0">
+            <a:schemeClr val="accent1"/>
+          </a:fillRef>
+          <a:effectRef idx="1">
+            <a:schemeClr val="accent1"/>
+          </a:effectRef>
+          <a:fontRef idx="minor">
+            <a:schemeClr val="tx1"/>
+          </a:fontRef>
+        </p:style>
+      </p:cxnSp>
+      <p:cxnSp>
+        <p:nvCxnSpPr>
+          <p:cNvPr id="140" name="Connector: Curved 139">
+            <a:extLst>
+              <a:ext uri="{FF2B5EF4-FFF2-40B4-BE49-F238E27FC236}">
+                <a16:creationId xmlns:a16="http://schemas.microsoft.com/office/drawing/2014/main" id="{C1FCD8FE-F60E-38C8-053A-C3B7D6393DAA}"/>
+              </a:ext>
+            </a:extLst>
+          </p:cNvPr>
+          <p:cNvCxnSpPr>
+            <a:cxnSpLocks/>
+            <a:stCxn id="55" idx="3"/>
+            <a:endCxn id="79" idx="1"/>
+          </p:cNvCxnSpPr>
+          <p:nvPr/>
+        </p:nvCxnSpPr>
+        <p:spPr>
+          <a:xfrm>
+            <a:off x="10673692" y="3611210"/>
+            <a:ext cx="181110" cy="302689"/>
+          </a:xfrm>
+          <a:prstGeom prst="curvedConnector3">
+            <a:avLst>
+              <a:gd name="adj1" fmla="val 50000"/>
+            </a:avLst>
+          </a:prstGeom>
+          <a:ln>
+            <a:tailEnd type="triangle"/>
+          </a:ln>
+        </p:spPr>
+        <p:style>
+          <a:lnRef idx="2">
+            <a:schemeClr val="accent1"/>
+          </a:lnRef>
+          <a:fillRef idx="0">
+            <a:schemeClr val="accent1"/>
+          </a:fillRef>
+          <a:effectRef idx="1">
+            <a:schemeClr val="accent1"/>
+          </a:effectRef>
+          <a:fontRef idx="minor">
+            <a:schemeClr val="tx1"/>
+          </a:fontRef>
+        </p:style>
+      </p:cxnSp>
+      <p:cxnSp>
+        <p:nvCxnSpPr>
+          <p:cNvPr id="146" name="Connector: Curved 145">
+            <a:extLst>
+              <a:ext uri="{FF2B5EF4-FFF2-40B4-BE49-F238E27FC236}">
+                <a16:creationId xmlns:a16="http://schemas.microsoft.com/office/drawing/2014/main" id="{B112785C-9F6D-4079-6102-D703F582BED7}"/>
+              </a:ext>
+            </a:extLst>
+          </p:cNvPr>
+          <p:cNvCxnSpPr>
+            <a:cxnSpLocks/>
+            <a:stCxn id="79" idx="3"/>
+            <a:endCxn id="83" idx="0"/>
+          </p:cNvCxnSpPr>
+          <p:nvPr/>
+        </p:nvCxnSpPr>
+        <p:spPr>
+          <a:xfrm flipH="1">
+            <a:off x="11539933" y="3913899"/>
+            <a:ext cx="144340" cy="667648"/>
+          </a:xfrm>
+          <a:prstGeom prst="curvedConnector4">
+            <a:avLst>
+              <a:gd name="adj1" fmla="val -158376"/>
+              <a:gd name="adj2" fmla="val 59220"/>
+            </a:avLst>
+          </a:prstGeom>
+          <a:ln>
+            <a:tailEnd type="triangle"/>
+          </a:ln>
+        </p:spPr>
+        <p:style>
+          <a:lnRef idx="2">
+            <a:schemeClr val="accent1"/>
+          </a:lnRef>
+          <a:fillRef idx="0">
+            <a:schemeClr val="accent1"/>
+          </a:fillRef>
+          <a:effectRef idx="1">
+            <a:schemeClr val="accent1"/>
+          </a:effectRef>
+          <a:fontRef idx="minor">
+            <a:schemeClr val="tx1"/>
+          </a:fontRef>
+        </p:style>
+      </p:cxnSp>
+      <p:cxnSp>
+        <p:nvCxnSpPr>
+          <p:cNvPr id="160" name="Connector: Curved 159">
+            <a:extLst>
+              <a:ext uri="{FF2B5EF4-FFF2-40B4-BE49-F238E27FC236}">
+                <a16:creationId xmlns:a16="http://schemas.microsoft.com/office/drawing/2014/main" id="{423A8FD2-7CA6-3E2A-2A0C-417E4F90D0C1}"/>
+              </a:ext>
+            </a:extLst>
+          </p:cNvPr>
+          <p:cNvCxnSpPr>
+            <a:cxnSpLocks/>
+            <a:stCxn id="63" idx="2"/>
+            <a:endCxn id="87" idx="1"/>
+          </p:cNvCxnSpPr>
+          <p:nvPr/>
+        </p:nvCxnSpPr>
+        <p:spPr>
+          <a:xfrm rot="16200000" flipH="1">
+            <a:off x="8164310" y="5064639"/>
+            <a:ext cx="1160643" cy="659633"/>
+          </a:xfrm>
+          <a:prstGeom prst="curvedConnector2">
+            <a:avLst/>
+          </a:prstGeom>
+          <a:ln>
+            <a:tailEnd type="triangle"/>
+          </a:ln>
+        </p:spPr>
+        <p:style>
+          <a:lnRef idx="2">
+            <a:schemeClr val="accent1"/>
+          </a:lnRef>
+          <a:fillRef idx="0">
+            <a:schemeClr val="accent1"/>
+          </a:fillRef>
+          <a:effectRef idx="1">
+            <a:schemeClr val="accent1"/>
+          </a:effectRef>
+          <a:fontRef idx="minor">
+            <a:schemeClr val="tx1"/>
+          </a:fontRef>
+        </p:style>
+      </p:cxnSp>
+      <p:cxnSp>
+        <p:nvCxnSpPr>
+          <p:cNvPr id="162" name="Connector: Curved 161">
+            <a:extLst>
+              <a:ext uri="{FF2B5EF4-FFF2-40B4-BE49-F238E27FC236}">
+                <a16:creationId xmlns:a16="http://schemas.microsoft.com/office/drawing/2014/main" id="{B4DE531B-94D7-3D58-E9A0-DABDA10E5535}"/>
+              </a:ext>
+            </a:extLst>
+          </p:cNvPr>
+          <p:cNvCxnSpPr>
+            <a:cxnSpLocks/>
+            <a:stCxn id="71" idx="2"/>
+            <a:endCxn id="87" idx="0"/>
+          </p:cNvCxnSpPr>
+          <p:nvPr/>
+        </p:nvCxnSpPr>
+        <p:spPr>
+          <a:xfrm rot="16200000" flipH="1">
+            <a:off x="9314410" y="5118199"/>
+            <a:ext cx="676859" cy="790075"/>
+          </a:xfrm>
+          <a:prstGeom prst="curvedConnector3">
+            <a:avLst/>
+          </a:prstGeom>
+          <a:ln>
+            <a:tailEnd type="triangle"/>
+          </a:ln>
+        </p:spPr>
+        <p:style>
+          <a:lnRef idx="2">
+            <a:schemeClr val="accent1"/>
+          </a:lnRef>
+          <a:fillRef idx="0">
+            <a:schemeClr val="accent1"/>
+          </a:fillRef>
+          <a:effectRef idx="1">
+            <a:schemeClr val="accent1"/>
+          </a:effectRef>
+          <a:fontRef idx="minor">
+            <a:schemeClr val="tx1"/>
+          </a:fontRef>
+        </p:style>
+      </p:cxnSp>
+      <p:cxnSp>
+        <p:nvCxnSpPr>
+          <p:cNvPr id="164" name="Connector: Curved 163">
+            <a:extLst>
+              <a:ext uri="{FF2B5EF4-FFF2-40B4-BE49-F238E27FC236}">
+                <a16:creationId xmlns:a16="http://schemas.microsoft.com/office/drawing/2014/main" id="{08A3B289-14D9-8BFA-C980-12D2508AAA9E}"/>
+              </a:ext>
+            </a:extLst>
+          </p:cNvPr>
+          <p:cNvCxnSpPr>
+            <a:cxnSpLocks/>
+            <a:stCxn id="91" idx="2"/>
+            <a:endCxn id="87" idx="0"/>
+          </p:cNvCxnSpPr>
+          <p:nvPr/>
+        </p:nvCxnSpPr>
+        <p:spPr>
+          <a:xfrm rot="5400000">
+            <a:off x="10074703" y="5149708"/>
+            <a:ext cx="675134" cy="728785"/>
+          </a:xfrm>
+          <a:prstGeom prst="curvedConnector3">
+            <a:avLst/>
+          </a:prstGeom>
+          <a:ln>
+            <a:tailEnd type="triangle"/>
+          </a:ln>
+        </p:spPr>
+        <p:style>
+          <a:lnRef idx="2">
+            <a:schemeClr val="accent1"/>
+          </a:lnRef>
+          <a:fillRef idx="0">
+            <a:schemeClr val="accent1"/>
+          </a:fillRef>
+          <a:effectRef idx="1">
+            <a:schemeClr val="accent1"/>
+          </a:effectRef>
+          <a:fontRef idx="minor">
+            <a:schemeClr val="tx1"/>
+          </a:fontRef>
+        </p:style>
+      </p:cxnSp>
+      <p:cxnSp>
+        <p:nvCxnSpPr>
+          <p:cNvPr id="166" name="Connector: Curved 165">
+            <a:extLst>
+              <a:ext uri="{FF2B5EF4-FFF2-40B4-BE49-F238E27FC236}">
+                <a16:creationId xmlns:a16="http://schemas.microsoft.com/office/drawing/2014/main" id="{49B8D72D-86CD-7065-DEBA-DE847BCB1C84}"/>
+              </a:ext>
+            </a:extLst>
+          </p:cNvPr>
+          <p:cNvCxnSpPr>
+            <a:cxnSpLocks/>
+            <a:stCxn id="83" idx="2"/>
+            <a:endCxn id="87" idx="3"/>
+          </p:cNvCxnSpPr>
+          <p:nvPr/>
+        </p:nvCxnSpPr>
+        <p:spPr>
+          <a:xfrm rot="5400000">
+            <a:off x="10707115" y="5141960"/>
+            <a:ext cx="1147010" cy="518627"/>
+          </a:xfrm>
+          <a:prstGeom prst="curvedConnector2">
+            <a:avLst/>
+          </a:prstGeom>
+          <a:ln>
+            <a:tailEnd type="triangle"/>
+          </a:ln>
+        </p:spPr>
+        <p:style>
+          <a:lnRef idx="2">
+            <a:schemeClr val="accent1"/>
+          </a:lnRef>
+          <a:fillRef idx="0">
+            <a:schemeClr val="accent1"/>
+          </a:fillRef>
+          <a:effectRef idx="1">
+            <a:schemeClr val="accent1"/>
+          </a:effectRef>
+          <a:fontRef idx="minor">
+            <a:schemeClr val="tx1"/>
+          </a:fontRef>
+        </p:style>
+      </p:cxnSp>
     </p:spTree>
     <p:extLst>
       <p:ext uri="{BB962C8B-B14F-4D97-AF65-F5344CB8AC3E}">

</xml_diff>